<commit_message>
poster update and readme update
</commit_message>
<xml_diff>
--- a/poster/poster - Face Mask Detection.pptx
+++ b/poster/poster - Face Mask Detection.pptx
@@ -121,6 +121,9 @@
           </p15:clr>
         </p15:guide>
       </p15:sldGuideLst>
+    </p:ext>
+    <p:ext uri="{2D200454-40CA-4A62-9FC3-DE9A4176ACB9}">
+      <p15:notesGuideLst xmlns:p15="http://schemas.microsoft.com/office/powerpoint/2012/main"/>
     </p:ext>
   </p:extLst>
 </p:presentation>
@@ -3866,7 +3869,7 @@
               </a:rPr>
               <a:t> </a:t>
             </a:r>
-            <a:endParaRPr lang="sr-Latn-RS" sz="6600" b="1" dirty="0" smtClean="0">
+            <a:endParaRPr lang="sr-Latn-RS" sz="6600" b="1" dirty="0">
               <a:ln w="3175">
                 <a:noFill/>
               </a:ln>
@@ -3880,7 +3883,7 @@
           </a:p>
           <a:p>
             <a:r>
-              <a:rPr lang="en-US" sz="6600" b="1" dirty="0" err="1" smtClean="0">
+              <a:rPr lang="en-US" sz="6600" b="1" dirty="0" err="1">
                 <a:ln w="3175">
                   <a:noFill/>
                 </a:ln>
@@ -3894,7 +3897,7 @@
               <a:t>korišćenjem</a:t>
             </a:r>
             <a:r>
-              <a:rPr lang="en-US" sz="6600" b="1" dirty="0" smtClean="0">
+              <a:rPr lang="en-US" sz="6600" b="1" dirty="0">
                 <a:ln w="3175">
                   <a:noFill/>
                 </a:ln>
@@ -4716,26 +4719,8 @@
                   <a:ea typeface="Al Bayan Plain" charset="-78"/>
                   <a:cs typeface="Al Bayan Plain" charset="-78"/>
                 </a:rPr>
-                <a:t>Za rešavanje navedenog problema koristila se YoloV5 arhitektura. YoloV5 kao detektor objekata sastoji se iz tri osnovne </a:t>
+                <a:t>Za rešavanje navedenog problema koristila se YoloV5 arhitektura. YoloV5 kao detektor objekata sastoji se iz tri osnovne celine: </a:t>
               </a:r>
-              <a:r>
-                <a:rPr lang="sr-Latn-RS" sz="2800" dirty="0" smtClean="0">
-                  <a:ea typeface="Al Bayan Plain" charset="-78"/>
-                  <a:cs typeface="Al Bayan Plain" charset="-78"/>
-                </a:rPr>
-                <a:t>celine</a:t>
-              </a:r>
-              <a:r>
-                <a:rPr lang="sr-Latn-RS" sz="2800" dirty="0">
-                  <a:ea typeface="Al Bayan Plain" charset="-78"/>
-                  <a:cs typeface="Al Bayan Plain" charset="-78"/>
-                </a:rPr>
-                <a:t>: </a:t>
-              </a:r>
-              <a:endParaRPr lang="sr-Latn-RS" sz="2800" dirty="0" smtClean="0">
-                <a:ea typeface="Al Bayan Plain" charset="-78"/>
-                <a:cs typeface="Al Bayan Plain" charset="-78"/>
-              </a:endParaRPr>
             </a:p>
             <a:p>
               <a:pPr marL="938212" indent="-457200" algn="just">
@@ -4746,7 +4731,7 @@
                 <a:buChar char="•"/>
               </a:pPr>
               <a:r>
-                <a:rPr lang="sr-Latn-RS" sz="2800" dirty="0" smtClean="0">
+                <a:rPr lang="sr-Latn-RS" sz="2800" dirty="0">
                   <a:ea typeface="Al Bayan Plain" charset="-78"/>
                   <a:cs typeface="Al Bayan Plain" charset="-78"/>
                 </a:rPr>
@@ -4762,7 +4747,7 @@
                 <a:buChar char="•"/>
               </a:pPr>
               <a:r>
-                <a:rPr lang="sr-Latn-RS" sz="2800" dirty="0" smtClean="0">
+                <a:rPr lang="sr-Latn-RS" sz="2800" dirty="0">
                   <a:ea typeface="Al Bayan Plain" charset="-78"/>
                   <a:cs typeface="Al Bayan Plain" charset="-78"/>
                 </a:rPr>
@@ -4778,7 +4763,7 @@
                 <a:buChar char="•"/>
               </a:pPr>
               <a:r>
-                <a:rPr lang="sr-Latn-RS" sz="2800" dirty="0" smtClean="0">
+                <a:rPr lang="sr-Latn-RS" sz="2800" dirty="0">
                   <a:ea typeface="Al Bayan Plain" charset="-78"/>
                   <a:cs typeface="Al Bayan Plain" charset="-78"/>
                 </a:rPr>
@@ -4796,54 +4781,8 @@
                   <a:ea typeface="Al Bayan Plain" charset="-78"/>
                   <a:cs typeface="Al Bayan Plain" charset="-78"/>
                 </a:rPr>
-                <a:t>Model Backbone predstavlja prvu komponentu koja je zadužena za ekstrakciju obeležja. Ona je zasnovana na konvolucionoj neuronskoj mreži CSPNet koja u odnosu na ResNet donosi </a:t>
+                <a:t>Model Backbone predstavlja prvu komponentu koja je zadužena za ekstrakciju obeležja. Ona je zasnovana na konvolucionoj neuronskoj mreži CSPNet koja u odnosu na ResNet donosi veliko poboljšanje u vidu performansi za detekciju. Druga komponenta - Model Neck zasnovana je na PANet neuronskoj mreži. Koristi se kao pomoć pri detekciji objekata različitih veličina i onih koji su u različitim razmerama. Treća komponenta odnosno Model Head koristi za se finalnu detekciju lica i sastoji se od potpuno povezanih slojeva čiji je zadatak da generišu finalni izlaz iz neuronske mreže sa rezultatima koji su nam neophodni.</a:t>
               </a:r>
-              <a:r>
-                <a:rPr lang="sr-Latn-RS" sz="2800" dirty="0" smtClean="0">
-                  <a:ea typeface="Al Bayan Plain" charset="-78"/>
-                  <a:cs typeface="Al Bayan Plain" charset="-78"/>
-                </a:rPr>
-                <a:t>veliko poboljšanje </a:t>
-              </a:r>
-              <a:r>
-                <a:rPr lang="sr-Latn-RS" sz="2800" dirty="0">
-                  <a:ea typeface="Al Bayan Plain" charset="-78"/>
-                  <a:cs typeface="Al Bayan Plain" charset="-78"/>
-                </a:rPr>
-                <a:t>u vidu performansi za detekciju. Druga komponenta - Model Neck zasnovana je na PANet neuronskoj mreži. Koristi se kao pomoć pri detekciji objekata različitih veličina i </a:t>
-              </a:r>
-              <a:r>
-                <a:rPr lang="sr-Latn-RS" sz="2800" dirty="0" smtClean="0">
-                  <a:ea typeface="Al Bayan Plain" charset="-78"/>
-                  <a:cs typeface="Al Bayan Plain" charset="-78"/>
-                </a:rPr>
-                <a:t>onih koji </a:t>
-              </a:r>
-              <a:r>
-                <a:rPr lang="sr-Latn-RS" sz="2800" dirty="0">
-                  <a:ea typeface="Al Bayan Plain" charset="-78"/>
-                  <a:cs typeface="Al Bayan Plain" charset="-78"/>
-                </a:rPr>
-                <a:t>su u različitim razmerama. Treća komponenta odnosno Model Head koristi za se finalnu detekciju lica i sastoji se od potpuno povezanih slojeva čiji je zadatak da generišu finalni </a:t>
-              </a:r>
-              <a:r>
-                <a:rPr lang="sr-Latn-RS" sz="2800" dirty="0" smtClean="0">
-                  <a:ea typeface="Al Bayan Plain" charset="-78"/>
-                  <a:cs typeface="Al Bayan Plain" charset="-78"/>
-                </a:rPr>
-                <a:t>izlaz iz </a:t>
-              </a:r>
-              <a:r>
-                <a:rPr lang="sr-Latn-RS" sz="2800" dirty="0">
-                  <a:ea typeface="Al Bayan Plain" charset="-78"/>
-                  <a:cs typeface="Al Bayan Plain" charset="-78"/>
-                </a:rPr>
-                <a:t>neuronske mreže sa rezultatima koji su nam neophodni.</a:t>
-              </a:r>
-              <a:endParaRPr lang="sr-Latn-RS" sz="2800" dirty="0" smtClean="0">
-                <a:ea typeface="Al Bayan Plain" charset="-78"/>
-                <a:cs typeface="Al Bayan Plain" charset="-78"/>
-              </a:endParaRPr>
             </a:p>
             <a:p>
               <a:pPr marL="481012" algn="ctr">
@@ -5022,28 +4961,12 @@
           <a:p>
             <a:pPr algn="ctr"/>
             <a:r>
-              <a:rPr lang="en-US" sz="2000" dirty="0" err="1" smtClean="0">
-                <a:solidFill>
-                  <a:schemeClr val="tx1"/>
-                </a:solidFill>
-              </a:rPr>
-              <a:t>Primeri</a:t>
-            </a:r>
-            <a:r>
-              <a:rPr lang="en-US" sz="2000" dirty="0" smtClean="0">
-                <a:solidFill>
-                  <a:schemeClr val="tx1"/>
-                </a:solidFill>
-              </a:rPr>
-              <a:t> </a:t>
-            </a:r>
-            <a:r>
               <a:rPr lang="en-US" sz="2000" dirty="0" err="1">
                 <a:solidFill>
                   <a:schemeClr val="tx1"/>
                 </a:solidFill>
               </a:rPr>
-              <a:t>slika</a:t>
+              <a:t>Primeri</a:t>
             </a:r>
             <a:r>
               <a:rPr lang="en-US" sz="2000" dirty="0">
@@ -5059,7 +4982,7 @@
                   <a:schemeClr val="tx1"/>
                 </a:solidFill>
               </a:rPr>
-              <a:t>iz</a:t>
+              <a:t>slika</a:t>
             </a:r>
             <a:r>
               <a:rPr lang="en-US" sz="2000" dirty="0">
@@ -5075,7 +4998,7 @@
                   <a:schemeClr val="tx1"/>
                 </a:solidFill>
               </a:rPr>
-              <a:t>skupa</a:t>
+              <a:t>iz</a:t>
             </a:r>
             <a:r>
               <a:rPr lang="en-US" sz="2000" dirty="0">
@@ -5091,15 +5014,23 @@
                   <a:schemeClr val="tx1"/>
                 </a:solidFill>
               </a:rPr>
-              <a:t>podataka</a:t>
-            </a:r>
-            <a:r>
-              <a:rPr lang="en-US" sz="2800" dirty="0">
+              <a:t>skupa</a:t>
+            </a:r>
+            <a:r>
+              <a:rPr lang="en-US" sz="2000" dirty="0">
                 <a:solidFill>
                   <a:schemeClr val="tx1"/>
                 </a:solidFill>
               </a:rPr>
-              <a:t/>
+              <a:t> </a:t>
+            </a:r>
+            <a:r>
+              <a:rPr lang="en-US" sz="2000" dirty="0" err="1">
+                <a:solidFill>
+                  <a:schemeClr val="tx1"/>
+                </a:solidFill>
+              </a:rPr>
+              <a:t>podataka</a:t>
             </a:r>
             <a:br>
               <a:rPr lang="en-US" sz="2800" dirty="0">
@@ -5223,7 +5154,7 @@
           <a:lstStyle/>
           <a:p>
             <a:r>
-              <a:rPr lang="en-US" sz="4800" i="1" dirty="0" err="1" smtClean="0">
+              <a:rPr lang="en-US" sz="4800" i="1" dirty="0" err="1">
                 <a:latin typeface="Lucida Fax" panose="02060602050505020204" pitchFamily="18" charset="77"/>
                 <a:cs typeface="Lucida Grande" panose="020B0600040502020204" pitchFamily="34" charset="0"/>
               </a:rPr>
@@ -5237,7 +5168,7 @@
               <a:t> </a:t>
             </a:r>
             <a:r>
-              <a:rPr lang="en-US" sz="4800" i="1" dirty="0" err="1" smtClean="0">
+              <a:rPr lang="en-US" sz="4800" i="1" dirty="0" err="1">
                 <a:latin typeface="Lucida Fax" panose="02060602050505020204" pitchFamily="18" charset="77"/>
                 <a:cs typeface="Lucida Grande" panose="020B0600040502020204" pitchFamily="34" charset="0"/>
               </a:rPr>
@@ -5265,14 +5196,14 @@
               <a:t> </a:t>
             </a:r>
             <a:r>
-              <a:rPr lang="en-US" sz="4800" i="1" dirty="0" err="1" smtClean="0">
+              <a:rPr lang="en-US" sz="4800" i="1" dirty="0" err="1">
                 <a:latin typeface="Lucida Fax" panose="02060602050505020204" pitchFamily="18" charset="77"/>
                 <a:cs typeface="Lucida Grande" panose="020B0600040502020204" pitchFamily="34" charset="0"/>
               </a:rPr>
               <a:t>nauka</a:t>
             </a:r>
             <a:r>
-              <a:rPr lang="sr-Latn-RS" sz="4800" i="1" dirty="0" smtClean="0">
+              <a:rPr lang="sr-Latn-RS" sz="4800" i="1" dirty="0">
                 <a:latin typeface="Lucida Fax" panose="02060602050505020204" pitchFamily="18" charset="77"/>
                 <a:cs typeface="Lucida Grande" panose="020B0600040502020204" pitchFamily="34" charset="0"/>
               </a:rPr>
@@ -5438,7 +5369,7 @@
         <p:spPr>
           <a:xfrm>
             <a:off x="13113287" y="21542320"/>
-            <a:ext cx="18463205" cy="461665"/>
+            <a:ext cx="18463205" cy="1569660"/>
           </a:xfrm>
           <a:prstGeom prst="rect">
             <a:avLst/>
@@ -5451,22 +5382,746 @@
           </a:bodyPr>
           <a:lstStyle/>
           <a:p>
-            <a:pPr marL="481012" algn="ctr">
+            <a:pPr marL="481012" algn="just">
               <a:spcAft>
                 <a:spcPts val="4000"/>
               </a:spcAft>
             </a:pPr>
             <a:r>
-              <a:rPr lang="sr-Latn-RS" sz="2400" dirty="0" smtClean="0">
-                <a:ea typeface="Al Bayan Plain" charset="-78"/>
-                <a:cs typeface="Al Bayan Plain" charset="-78"/>
-              </a:rPr>
-              <a:t>ss</a:t>
-            </a:r>
-            <a:endParaRPr lang="en-US" sz="2400" dirty="0">
-              <a:ea typeface="Al Bayan Plain" charset="-78"/>
-              <a:cs typeface="Al Bayan Plain" charset="-78"/>
-            </a:endParaRPr>
+              <a:rPr lang="en-US" sz="2400" dirty="0">
+                <a:ea typeface="Al Bayan Plain" charset="-78"/>
+                <a:cs typeface="Al Bayan Plain" charset="-78"/>
+              </a:rPr>
+              <a:t>Model je </a:t>
+            </a:r>
+            <a:r>
+              <a:rPr lang="en-US" sz="2400" dirty="0" err="1">
+                <a:ea typeface="Al Bayan Plain" charset="-78"/>
+                <a:cs typeface="Al Bayan Plain" charset="-78"/>
+              </a:rPr>
+              <a:t>prvo</a:t>
+            </a:r>
+            <a:r>
+              <a:rPr lang="en-US" sz="2400" dirty="0">
+                <a:ea typeface="Al Bayan Plain" charset="-78"/>
+                <a:cs typeface="Al Bayan Plain" charset="-78"/>
+              </a:rPr>
+              <a:t> </a:t>
+            </a:r>
+            <a:r>
+              <a:rPr lang="en-US" sz="2400" dirty="0" err="1">
+                <a:ea typeface="Al Bayan Plain" charset="-78"/>
+                <a:cs typeface="Al Bayan Plain" charset="-78"/>
+              </a:rPr>
+              <a:t>treniran</a:t>
+            </a:r>
+            <a:r>
+              <a:rPr lang="en-US" sz="2400" dirty="0">
+                <a:ea typeface="Al Bayan Plain" charset="-78"/>
+                <a:cs typeface="Al Bayan Plain" charset="-78"/>
+              </a:rPr>
+              <a:t> </a:t>
+            </a:r>
+            <a:r>
+              <a:rPr lang="en-US" sz="2400" dirty="0" err="1">
+                <a:ea typeface="Al Bayan Plain" charset="-78"/>
+                <a:cs typeface="Al Bayan Plain" charset="-78"/>
+              </a:rPr>
+              <a:t>na</a:t>
+            </a:r>
+            <a:r>
+              <a:rPr lang="en-US" sz="2400" dirty="0">
+                <a:ea typeface="Al Bayan Plain" charset="-78"/>
+                <a:cs typeface="Al Bayan Plain" charset="-78"/>
+              </a:rPr>
+              <a:t> </a:t>
+            </a:r>
+            <a:r>
+              <a:rPr lang="en-US" sz="2400" dirty="0" err="1">
+                <a:ea typeface="Al Bayan Plain" charset="-78"/>
+                <a:cs typeface="Al Bayan Plain" charset="-78"/>
+              </a:rPr>
+              <a:t>osnovnom</a:t>
+            </a:r>
+            <a:r>
+              <a:rPr lang="en-US" sz="2400" dirty="0">
+                <a:ea typeface="Al Bayan Plain" charset="-78"/>
+                <a:cs typeface="Al Bayan Plain" charset="-78"/>
+              </a:rPr>
+              <a:t> </a:t>
+            </a:r>
+            <a:r>
+              <a:rPr lang="en-US" sz="2400" dirty="0" err="1">
+                <a:ea typeface="Al Bayan Plain" charset="-78"/>
+                <a:cs typeface="Al Bayan Plain" charset="-78"/>
+              </a:rPr>
+              <a:t>skupu</a:t>
+            </a:r>
+            <a:r>
+              <a:rPr lang="en-US" sz="2400" dirty="0">
+                <a:ea typeface="Al Bayan Plain" charset="-78"/>
+                <a:cs typeface="Al Bayan Plain" charset="-78"/>
+              </a:rPr>
+              <a:t> </a:t>
+            </a:r>
+            <a:r>
+              <a:rPr lang="en-US" sz="2400" dirty="0" err="1">
+                <a:ea typeface="Al Bayan Plain" charset="-78"/>
+                <a:cs typeface="Al Bayan Plain" charset="-78"/>
+              </a:rPr>
+              <a:t>podataka</a:t>
+            </a:r>
+            <a:r>
+              <a:rPr lang="en-US" sz="2400" dirty="0">
+                <a:ea typeface="Al Bayan Plain" charset="-78"/>
+                <a:cs typeface="Al Bayan Plain" charset="-78"/>
+              </a:rPr>
+              <a:t> bez </a:t>
+            </a:r>
+            <a:r>
+              <a:rPr lang="en-US" sz="2400" dirty="0" err="1">
+                <a:ea typeface="Al Bayan Plain" charset="-78"/>
+                <a:cs typeface="Al Bayan Plain" charset="-78"/>
+              </a:rPr>
+              <a:t>augmentacije</a:t>
+            </a:r>
+            <a:r>
+              <a:rPr lang="en-US" sz="2400" dirty="0">
+                <a:ea typeface="Al Bayan Plain" charset="-78"/>
+                <a:cs typeface="Al Bayan Plain" charset="-78"/>
+              </a:rPr>
+              <a:t>. </a:t>
+            </a:r>
+            <a:r>
+              <a:rPr lang="en-US" sz="2400" dirty="0" err="1">
+                <a:ea typeface="Al Bayan Plain" charset="-78"/>
+                <a:cs typeface="Al Bayan Plain" charset="-78"/>
+              </a:rPr>
+              <a:t>Nakon</a:t>
+            </a:r>
+            <a:r>
+              <a:rPr lang="en-US" sz="2400" dirty="0">
+                <a:ea typeface="Al Bayan Plain" charset="-78"/>
+                <a:cs typeface="Al Bayan Plain" charset="-78"/>
+              </a:rPr>
+              <a:t> toga </a:t>
+            </a:r>
+            <a:r>
+              <a:rPr lang="en-US" sz="2400" dirty="0" err="1">
+                <a:ea typeface="Al Bayan Plain" charset="-78"/>
+                <a:cs typeface="Al Bayan Plain" charset="-78"/>
+              </a:rPr>
+              <a:t>primećeno</a:t>
+            </a:r>
+            <a:r>
+              <a:rPr lang="en-US" sz="2400" dirty="0">
+                <a:ea typeface="Al Bayan Plain" charset="-78"/>
+                <a:cs typeface="Al Bayan Plain" charset="-78"/>
+              </a:rPr>
+              <a:t> je da se model </a:t>
+            </a:r>
+            <a:r>
+              <a:rPr lang="en-US" sz="2400" dirty="0" err="1">
+                <a:ea typeface="Al Bayan Plain" charset="-78"/>
+                <a:cs typeface="Al Bayan Plain" charset="-78"/>
+              </a:rPr>
+              <a:t>lošije</a:t>
+            </a:r>
+            <a:r>
+              <a:rPr lang="en-US" sz="2400" dirty="0">
+                <a:ea typeface="Al Bayan Plain" charset="-78"/>
+                <a:cs typeface="Al Bayan Plain" charset="-78"/>
+              </a:rPr>
+              <a:t> </a:t>
+            </a:r>
+            <a:r>
+              <a:rPr lang="en-US" sz="2400" dirty="0" err="1">
+                <a:ea typeface="Al Bayan Plain" charset="-78"/>
+                <a:cs typeface="Al Bayan Plain" charset="-78"/>
+              </a:rPr>
+              <a:t>ponaša</a:t>
+            </a:r>
+            <a:r>
+              <a:rPr lang="en-US" sz="2400" dirty="0">
+                <a:ea typeface="Al Bayan Plain" charset="-78"/>
+                <a:cs typeface="Al Bayan Plain" charset="-78"/>
+              </a:rPr>
+              <a:t> za </a:t>
+            </a:r>
+            <a:r>
+              <a:rPr lang="en-US" sz="2400" dirty="0" err="1">
+                <a:ea typeface="Al Bayan Plain" charset="-78"/>
+                <a:cs typeface="Al Bayan Plain" charset="-78"/>
+              </a:rPr>
+              <a:t>ulazne</a:t>
+            </a:r>
+            <a:r>
+              <a:rPr lang="en-US" sz="2400" dirty="0">
+                <a:ea typeface="Al Bayan Plain" charset="-78"/>
+                <a:cs typeface="Al Bayan Plain" charset="-78"/>
+              </a:rPr>
+              <a:t> </a:t>
+            </a:r>
+            <a:r>
+              <a:rPr lang="en-US" sz="2400" dirty="0" err="1">
+                <a:ea typeface="Al Bayan Plain" charset="-78"/>
+                <a:cs typeface="Al Bayan Plain" charset="-78"/>
+              </a:rPr>
+              <a:t>podatke</a:t>
+            </a:r>
+            <a:r>
+              <a:rPr lang="en-US" sz="2400" dirty="0">
+                <a:ea typeface="Al Bayan Plain" charset="-78"/>
+                <a:cs typeface="Al Bayan Plain" charset="-78"/>
+              </a:rPr>
+              <a:t> </a:t>
+            </a:r>
+            <a:r>
+              <a:rPr lang="en-US" sz="2400" dirty="0" err="1">
+                <a:ea typeface="Al Bayan Plain" charset="-78"/>
+                <a:cs typeface="Al Bayan Plain" charset="-78"/>
+              </a:rPr>
+              <a:t>na</a:t>
+            </a:r>
+            <a:r>
+              <a:rPr lang="en-US" sz="2400" dirty="0">
+                <a:ea typeface="Al Bayan Plain" charset="-78"/>
+                <a:cs typeface="Al Bayan Plain" charset="-78"/>
+              </a:rPr>
+              <a:t> </a:t>
+            </a:r>
+            <a:r>
+              <a:rPr lang="en-US" sz="2400" dirty="0" err="1">
+                <a:ea typeface="Al Bayan Plain" charset="-78"/>
+                <a:cs typeface="Al Bayan Plain" charset="-78"/>
+              </a:rPr>
+              <a:t>kojima</a:t>
+            </a:r>
+            <a:r>
+              <a:rPr lang="en-US" sz="2400" dirty="0">
+                <a:ea typeface="Al Bayan Plain" charset="-78"/>
+                <a:cs typeface="Al Bayan Plain" charset="-78"/>
+              </a:rPr>
+              <a:t> je </a:t>
+            </a:r>
+            <a:r>
+              <a:rPr lang="en-US" sz="2400" dirty="0" err="1">
+                <a:ea typeface="Al Bayan Plain" charset="-78"/>
+                <a:cs typeface="Al Bayan Plain" charset="-78"/>
+              </a:rPr>
+              <a:t>loše</a:t>
+            </a:r>
+            <a:r>
+              <a:rPr lang="en-US" sz="2400" dirty="0">
+                <a:ea typeface="Al Bayan Plain" charset="-78"/>
+                <a:cs typeface="Al Bayan Plain" charset="-78"/>
+              </a:rPr>
+              <a:t> </a:t>
+            </a:r>
+            <a:r>
+              <a:rPr lang="en-US" sz="2400" dirty="0" err="1">
+                <a:ea typeface="Al Bayan Plain" charset="-78"/>
+                <a:cs typeface="Al Bayan Plain" charset="-78"/>
+              </a:rPr>
+              <a:t>osvetljenje</a:t>
+            </a:r>
+            <a:r>
+              <a:rPr lang="en-US" sz="2400" dirty="0">
+                <a:ea typeface="Al Bayan Plain" charset="-78"/>
+                <a:cs typeface="Al Bayan Plain" charset="-78"/>
+              </a:rPr>
+              <a:t> </a:t>
+            </a:r>
+            <a:r>
+              <a:rPr lang="en-US" sz="2400" dirty="0" err="1">
+                <a:ea typeface="Al Bayan Plain" charset="-78"/>
+                <a:cs typeface="Al Bayan Plain" charset="-78"/>
+              </a:rPr>
+              <a:t>ili</a:t>
+            </a:r>
+            <a:r>
+              <a:rPr lang="en-US" sz="2400" dirty="0">
+                <a:ea typeface="Al Bayan Plain" charset="-78"/>
+                <a:cs typeface="Al Bayan Plain" charset="-78"/>
+              </a:rPr>
+              <a:t> koji </a:t>
+            </a:r>
+            <a:r>
+              <a:rPr lang="en-US" sz="2400" dirty="0" err="1">
+                <a:ea typeface="Al Bayan Plain" charset="-78"/>
+                <a:cs typeface="Al Bayan Plain" charset="-78"/>
+              </a:rPr>
+              <a:t>su</a:t>
+            </a:r>
+            <a:r>
+              <a:rPr lang="en-US" sz="2400" dirty="0">
+                <a:ea typeface="Al Bayan Plain" charset="-78"/>
+                <a:cs typeface="Al Bayan Plain" charset="-78"/>
+              </a:rPr>
+              <a:t> </a:t>
+            </a:r>
+            <a:r>
+              <a:rPr lang="en-US" sz="2400" dirty="0" err="1">
+                <a:ea typeface="Al Bayan Plain" charset="-78"/>
+                <a:cs typeface="Al Bayan Plain" charset="-78"/>
+              </a:rPr>
+              <a:t>zamućeni</a:t>
+            </a:r>
+            <a:r>
+              <a:rPr lang="en-US" sz="2400" dirty="0">
+                <a:ea typeface="Al Bayan Plain" charset="-78"/>
+                <a:cs typeface="Al Bayan Plain" charset="-78"/>
+              </a:rPr>
+              <a:t>. </a:t>
+            </a:r>
+            <a:r>
+              <a:rPr lang="en-US" sz="2400" dirty="0" err="1">
+                <a:ea typeface="Al Bayan Plain" charset="-78"/>
+                <a:cs typeface="Al Bayan Plain" charset="-78"/>
+              </a:rPr>
+              <a:t>Nakon</a:t>
+            </a:r>
+            <a:r>
+              <a:rPr lang="en-US" sz="2400" dirty="0">
+                <a:ea typeface="Al Bayan Plain" charset="-78"/>
+                <a:cs typeface="Al Bayan Plain" charset="-78"/>
+              </a:rPr>
+              <a:t> toga </a:t>
+            </a:r>
+            <a:r>
+              <a:rPr lang="en-US" sz="2400" dirty="0" err="1">
+                <a:ea typeface="Al Bayan Plain" charset="-78"/>
+                <a:cs typeface="Al Bayan Plain" charset="-78"/>
+              </a:rPr>
+              <a:t>urađena</a:t>
+            </a:r>
+            <a:r>
+              <a:rPr lang="en-US" sz="2400" dirty="0">
+                <a:ea typeface="Al Bayan Plain" charset="-78"/>
+                <a:cs typeface="Al Bayan Plain" charset="-78"/>
+              </a:rPr>
+              <a:t> je </a:t>
+            </a:r>
+            <a:r>
+              <a:rPr lang="en-US" sz="2400" dirty="0" err="1">
+                <a:ea typeface="Al Bayan Plain" charset="-78"/>
+                <a:cs typeface="Al Bayan Plain" charset="-78"/>
+              </a:rPr>
+              <a:t>augmentacija</a:t>
+            </a:r>
+            <a:r>
+              <a:rPr lang="en-US" sz="2400" dirty="0">
+                <a:ea typeface="Al Bayan Plain" charset="-78"/>
+                <a:cs typeface="Al Bayan Plain" charset="-78"/>
+              </a:rPr>
+              <a:t> </a:t>
+            </a:r>
+            <a:r>
+              <a:rPr lang="en-US" sz="2400" dirty="0" err="1">
+                <a:ea typeface="Al Bayan Plain" charset="-78"/>
+                <a:cs typeface="Al Bayan Plain" charset="-78"/>
+              </a:rPr>
+              <a:t>podataka</a:t>
+            </a:r>
+            <a:r>
+              <a:rPr lang="en-US" sz="2400" dirty="0">
+                <a:ea typeface="Al Bayan Plain" charset="-78"/>
+                <a:cs typeface="Al Bayan Plain" charset="-78"/>
+              </a:rPr>
+              <a:t> </a:t>
+            </a:r>
+            <a:r>
+              <a:rPr lang="en-US" sz="2400" dirty="0" err="1">
+                <a:ea typeface="Al Bayan Plain" charset="-78"/>
+                <a:cs typeface="Al Bayan Plain" charset="-78"/>
+              </a:rPr>
+              <a:t>gde</a:t>
+            </a:r>
+            <a:r>
+              <a:rPr lang="en-US" sz="2400" dirty="0">
+                <a:ea typeface="Al Bayan Plain" charset="-78"/>
+                <a:cs typeface="Al Bayan Plain" charset="-78"/>
+              </a:rPr>
+              <a:t> je </a:t>
+            </a:r>
+            <a:r>
+              <a:rPr lang="en-US" sz="2400" dirty="0" err="1">
+                <a:ea typeface="Al Bayan Plain" charset="-78"/>
+                <a:cs typeface="Al Bayan Plain" charset="-78"/>
+              </a:rPr>
+              <a:t>smanjena</a:t>
+            </a:r>
+            <a:r>
+              <a:rPr lang="en-US" sz="2400" dirty="0">
+                <a:ea typeface="Al Bayan Plain" charset="-78"/>
+                <a:cs typeface="Al Bayan Plain" charset="-78"/>
+              </a:rPr>
+              <a:t> </a:t>
+            </a:r>
+            <a:r>
+              <a:rPr lang="en-US" sz="2400" dirty="0" err="1">
+                <a:ea typeface="Al Bayan Plain" charset="-78"/>
+                <a:cs typeface="Al Bayan Plain" charset="-78"/>
+              </a:rPr>
+              <a:t>svetlost</a:t>
+            </a:r>
+            <a:r>
+              <a:rPr lang="en-US" sz="2400" dirty="0">
+                <a:ea typeface="Al Bayan Plain" charset="-78"/>
+                <a:cs typeface="Al Bayan Plain" charset="-78"/>
+              </a:rPr>
+              <a:t> </a:t>
+            </a:r>
+            <a:r>
+              <a:rPr lang="en-US" sz="2400" dirty="0" err="1">
+                <a:ea typeface="Al Bayan Plain" charset="-78"/>
+                <a:cs typeface="Al Bayan Plain" charset="-78"/>
+              </a:rPr>
+              <a:t>na</a:t>
+            </a:r>
+            <a:r>
+              <a:rPr lang="en-US" sz="2400" dirty="0">
+                <a:ea typeface="Al Bayan Plain" charset="-78"/>
+                <a:cs typeface="Al Bayan Plain" charset="-78"/>
+              </a:rPr>
+              <a:t> </a:t>
+            </a:r>
+            <a:r>
+              <a:rPr lang="en-US" sz="2400" dirty="0" err="1">
+                <a:ea typeface="Al Bayan Plain" charset="-78"/>
+                <a:cs typeface="Al Bayan Plain" charset="-78"/>
+              </a:rPr>
+              <a:t>ulazu</a:t>
+            </a:r>
+            <a:r>
+              <a:rPr lang="en-US" sz="2400" dirty="0">
+                <a:ea typeface="Al Bayan Plain" charset="-78"/>
+                <a:cs typeface="Al Bayan Plain" charset="-78"/>
+              </a:rPr>
+              <a:t> </a:t>
+            </a:r>
+            <a:r>
+              <a:rPr lang="en-US" sz="2400" dirty="0" err="1">
+                <a:ea typeface="Al Bayan Plain" charset="-78"/>
+                <a:cs typeface="Al Bayan Plain" charset="-78"/>
+              </a:rPr>
+              <a:t>kod</a:t>
+            </a:r>
+            <a:r>
+              <a:rPr lang="en-US" sz="2400" dirty="0">
+                <a:ea typeface="Al Bayan Plain" charset="-78"/>
+                <a:cs typeface="Al Bayan Plain" charset="-78"/>
+              </a:rPr>
+              <a:t> </a:t>
+            </a:r>
+            <a:r>
+              <a:rPr lang="en-US" sz="2400" dirty="0" err="1">
+                <a:ea typeface="Al Bayan Plain" charset="-78"/>
+                <a:cs typeface="Al Bayan Plain" charset="-78"/>
+              </a:rPr>
+              <a:t>trećine</a:t>
+            </a:r>
+            <a:r>
+              <a:rPr lang="en-US" sz="2400" dirty="0">
+                <a:ea typeface="Al Bayan Plain" charset="-78"/>
+                <a:cs typeface="Al Bayan Plain" charset="-78"/>
+              </a:rPr>
+              <a:t> </a:t>
+            </a:r>
+            <a:r>
+              <a:rPr lang="en-US" sz="2400" dirty="0" err="1">
+                <a:ea typeface="Al Bayan Plain" charset="-78"/>
+                <a:cs typeface="Al Bayan Plain" charset="-78"/>
+              </a:rPr>
+              <a:t>skupa</a:t>
+            </a:r>
+            <a:r>
+              <a:rPr lang="en-US" sz="2400" dirty="0">
+                <a:ea typeface="Al Bayan Plain" charset="-78"/>
+                <a:cs typeface="Al Bayan Plain" charset="-78"/>
+              </a:rPr>
+              <a:t>, </a:t>
+            </a:r>
+            <a:r>
+              <a:rPr lang="en-US" sz="2400" dirty="0" err="1">
+                <a:ea typeface="Al Bayan Plain" charset="-78"/>
+                <a:cs typeface="Al Bayan Plain" charset="-78"/>
+              </a:rPr>
+              <a:t>i</a:t>
+            </a:r>
+            <a:r>
+              <a:rPr lang="en-US" sz="2400" dirty="0">
+                <a:ea typeface="Al Bayan Plain" charset="-78"/>
+                <a:cs typeface="Al Bayan Plain" charset="-78"/>
+              </a:rPr>
+              <a:t> </a:t>
+            </a:r>
+            <a:r>
+              <a:rPr lang="en-US" sz="2400" dirty="0" err="1">
+                <a:ea typeface="Al Bayan Plain" charset="-78"/>
+                <a:cs typeface="Al Bayan Plain" charset="-78"/>
+              </a:rPr>
+              <a:t>augmentirano</a:t>
+            </a:r>
+            <a:r>
+              <a:rPr lang="en-US" sz="2400" dirty="0">
+                <a:ea typeface="Al Bayan Plain" charset="-78"/>
+                <a:cs typeface="Al Bayan Plain" charset="-78"/>
+              </a:rPr>
+              <a:t> je </a:t>
+            </a:r>
+            <a:r>
+              <a:rPr lang="en-US" sz="2400" dirty="0" err="1">
+                <a:ea typeface="Al Bayan Plain" charset="-78"/>
+                <a:cs typeface="Al Bayan Plain" charset="-78"/>
+              </a:rPr>
+              <a:t>dodatnih</a:t>
+            </a:r>
+            <a:r>
+              <a:rPr lang="en-US" sz="2400" dirty="0">
+                <a:ea typeface="Al Bayan Plain" charset="-78"/>
+                <a:cs typeface="Al Bayan Plain" charset="-78"/>
+              </a:rPr>
+              <a:t> 800 </a:t>
+            </a:r>
+            <a:r>
+              <a:rPr lang="en-US" sz="2400" dirty="0" err="1">
+                <a:ea typeface="Al Bayan Plain" charset="-78"/>
+                <a:cs typeface="Al Bayan Plain" charset="-78"/>
+              </a:rPr>
+              <a:t>slika</a:t>
+            </a:r>
+            <a:r>
+              <a:rPr lang="en-US" sz="2400" dirty="0">
+                <a:ea typeface="Al Bayan Plain" charset="-78"/>
+                <a:cs typeface="Al Bayan Plain" charset="-78"/>
+              </a:rPr>
+              <a:t> </a:t>
+            </a:r>
+            <a:r>
+              <a:rPr lang="en-US" sz="2400" dirty="0" err="1">
+                <a:ea typeface="Al Bayan Plain" charset="-78"/>
+                <a:cs typeface="Al Bayan Plain" charset="-78"/>
+              </a:rPr>
+              <a:t>koje</a:t>
+            </a:r>
+            <a:r>
+              <a:rPr lang="en-US" sz="2400" dirty="0">
+                <a:ea typeface="Al Bayan Plain" charset="-78"/>
+                <a:cs typeface="Al Bayan Plain" charset="-78"/>
+              </a:rPr>
+              <a:t> </a:t>
+            </a:r>
+            <a:r>
+              <a:rPr lang="en-US" sz="2400" dirty="0" err="1">
+                <a:ea typeface="Al Bayan Plain" charset="-78"/>
+                <a:cs typeface="Al Bayan Plain" charset="-78"/>
+              </a:rPr>
+              <a:t>su</a:t>
+            </a:r>
+            <a:r>
+              <a:rPr lang="en-US" sz="2400" dirty="0">
+                <a:ea typeface="Al Bayan Plain" charset="-78"/>
+                <a:cs typeface="Al Bayan Plain" charset="-78"/>
+              </a:rPr>
+              <a:t> "</a:t>
+            </a:r>
+            <a:r>
+              <a:rPr lang="en-US" sz="2400" dirty="0" err="1">
+                <a:ea typeface="Al Bayan Plain" charset="-78"/>
+                <a:cs typeface="Al Bayan Plain" charset="-78"/>
+              </a:rPr>
+              <a:t>blurovane</a:t>
+            </a:r>
+            <a:r>
+              <a:rPr lang="en-US" sz="2400" dirty="0">
+                <a:ea typeface="Al Bayan Plain" charset="-78"/>
+                <a:cs typeface="Al Bayan Plain" charset="-78"/>
+              </a:rPr>
+              <a:t>" </a:t>
+            </a:r>
+            <a:r>
+              <a:rPr lang="en-US" sz="2400" dirty="0" err="1">
+                <a:ea typeface="Al Bayan Plain" charset="-78"/>
+                <a:cs typeface="Al Bayan Plain" charset="-78"/>
+              </a:rPr>
+              <a:t>odnosno</a:t>
+            </a:r>
+            <a:r>
+              <a:rPr lang="en-US" sz="2400" dirty="0">
+                <a:ea typeface="Al Bayan Plain" charset="-78"/>
+                <a:cs typeface="Al Bayan Plain" charset="-78"/>
+              </a:rPr>
+              <a:t> </a:t>
+            </a:r>
+            <a:r>
+              <a:rPr lang="en-US" sz="2400" dirty="0" err="1">
+                <a:ea typeface="Al Bayan Plain" charset="-78"/>
+                <a:cs typeface="Al Bayan Plain" charset="-78"/>
+              </a:rPr>
+              <a:t>zamućene</a:t>
+            </a:r>
+            <a:r>
+              <a:rPr lang="en-US" sz="2400" dirty="0">
+                <a:ea typeface="Al Bayan Plain" charset="-78"/>
+                <a:cs typeface="Al Bayan Plain" charset="-78"/>
+              </a:rPr>
+              <a:t> </a:t>
+            </a:r>
+            <a:r>
+              <a:rPr lang="en-US" sz="2400" dirty="0" err="1">
+                <a:ea typeface="Al Bayan Plain" charset="-78"/>
+                <a:cs typeface="Al Bayan Plain" charset="-78"/>
+              </a:rPr>
+              <a:t>kako</a:t>
+            </a:r>
+            <a:r>
+              <a:rPr lang="en-US" sz="2400" dirty="0">
+                <a:ea typeface="Al Bayan Plain" charset="-78"/>
+                <a:cs typeface="Al Bayan Plain" charset="-78"/>
+              </a:rPr>
+              <a:t> bi model bio </a:t>
+            </a:r>
+            <a:r>
+              <a:rPr lang="en-US" sz="2400" dirty="0" err="1">
+                <a:ea typeface="Al Bayan Plain" charset="-78"/>
+                <a:cs typeface="Al Bayan Plain" charset="-78"/>
+              </a:rPr>
+              <a:t>fleksibilniji</a:t>
+            </a:r>
+            <a:r>
+              <a:rPr lang="en-US" sz="2400" dirty="0">
+                <a:ea typeface="Al Bayan Plain" charset="-78"/>
+                <a:cs typeface="Al Bayan Plain" charset="-78"/>
+              </a:rPr>
+              <a:t>. Kao </a:t>
+            </a:r>
+            <a:r>
+              <a:rPr lang="en-US" sz="2400" dirty="0" err="1">
+                <a:ea typeface="Al Bayan Plain" charset="-78"/>
+                <a:cs typeface="Al Bayan Plain" charset="-78"/>
+              </a:rPr>
+              <a:t>evaluacija</a:t>
+            </a:r>
+            <a:r>
+              <a:rPr lang="en-US" sz="2400" dirty="0">
+                <a:ea typeface="Al Bayan Plain" charset="-78"/>
+                <a:cs typeface="Al Bayan Plain" charset="-78"/>
+              </a:rPr>
+              <a:t> </a:t>
+            </a:r>
+            <a:r>
+              <a:rPr lang="en-US" sz="2400" dirty="0" err="1">
+                <a:ea typeface="Al Bayan Plain" charset="-78"/>
+                <a:cs typeface="Al Bayan Plain" charset="-78"/>
+              </a:rPr>
+              <a:t>tačnosti</a:t>
+            </a:r>
+            <a:r>
+              <a:rPr lang="en-US" sz="2400" dirty="0">
+                <a:ea typeface="Al Bayan Plain" charset="-78"/>
+                <a:cs typeface="Al Bayan Plain" charset="-78"/>
+              </a:rPr>
+              <a:t> </a:t>
+            </a:r>
+            <a:r>
+              <a:rPr lang="en-US" sz="2400" dirty="0" err="1">
+                <a:ea typeface="Al Bayan Plain" charset="-78"/>
+                <a:cs typeface="Al Bayan Plain" charset="-78"/>
+              </a:rPr>
+              <a:t>korišćen</a:t>
+            </a:r>
+            <a:r>
+              <a:rPr lang="en-US" sz="2400" dirty="0">
+                <a:ea typeface="Al Bayan Plain" charset="-78"/>
+                <a:cs typeface="Al Bayan Plain" charset="-78"/>
+              </a:rPr>
+              <a:t> je </a:t>
+            </a:r>
+            <a:r>
+              <a:rPr lang="en-US" sz="2400" dirty="0" err="1">
+                <a:ea typeface="Al Bayan Plain" charset="-78"/>
+                <a:cs typeface="Al Bayan Plain" charset="-78"/>
+              </a:rPr>
+              <a:t>mAP</a:t>
+            </a:r>
+            <a:r>
+              <a:rPr lang="en-US" sz="2400" dirty="0">
+                <a:ea typeface="Al Bayan Plain" charset="-78"/>
+                <a:cs typeface="Al Bayan Plain" charset="-78"/>
+              </a:rPr>
+              <a:t> </a:t>
+            </a:r>
+            <a:r>
+              <a:rPr lang="en-US" sz="2400" dirty="0" err="1">
+                <a:ea typeface="Al Bayan Plain" charset="-78"/>
+                <a:cs typeface="Al Bayan Plain" charset="-78"/>
+              </a:rPr>
+              <a:t>odnosno</a:t>
+            </a:r>
+            <a:r>
+              <a:rPr lang="en-US" sz="2400" dirty="0">
+                <a:ea typeface="Al Bayan Plain" charset="-78"/>
+                <a:cs typeface="Al Bayan Plain" charset="-78"/>
+              </a:rPr>
+              <a:t> mean average precision, a </a:t>
+            </a:r>
+            <a:r>
+              <a:rPr lang="en-US" sz="2400" dirty="0" err="1">
+                <a:ea typeface="Al Bayan Plain" charset="-78"/>
+                <a:cs typeface="Al Bayan Plain" charset="-78"/>
+              </a:rPr>
+              <a:t>dobijeni</a:t>
+            </a:r>
+            <a:r>
+              <a:rPr lang="en-US" sz="2400" dirty="0">
+                <a:ea typeface="Al Bayan Plain" charset="-78"/>
+                <a:cs typeface="Al Bayan Plain" charset="-78"/>
+              </a:rPr>
+              <a:t> </a:t>
+            </a:r>
+            <a:r>
+              <a:rPr lang="en-US" sz="2400" dirty="0" err="1">
+                <a:ea typeface="Al Bayan Plain" charset="-78"/>
+                <a:cs typeface="Al Bayan Plain" charset="-78"/>
+              </a:rPr>
+              <a:t>su</a:t>
+            </a:r>
+            <a:r>
+              <a:rPr lang="en-US" sz="2400" dirty="0">
+                <a:ea typeface="Al Bayan Plain" charset="-78"/>
+                <a:cs typeface="Al Bayan Plain" charset="-78"/>
+              </a:rPr>
+              <a:t> </a:t>
+            </a:r>
+            <a:r>
+              <a:rPr lang="en-US" sz="2400" dirty="0" err="1">
+                <a:ea typeface="Al Bayan Plain" charset="-78"/>
+                <a:cs typeface="Al Bayan Plain" charset="-78"/>
+              </a:rPr>
+              <a:t>sledeći</a:t>
+            </a:r>
+            <a:r>
+              <a:rPr lang="en-US" sz="2400" dirty="0">
+                <a:ea typeface="Al Bayan Plain" charset="-78"/>
+                <a:cs typeface="Al Bayan Plain" charset="-78"/>
+              </a:rPr>
+              <a:t> </a:t>
+            </a:r>
+            <a:r>
+              <a:rPr lang="en-US" sz="2400" dirty="0" err="1">
+                <a:ea typeface="Al Bayan Plain" charset="-78"/>
+                <a:cs typeface="Al Bayan Plain" charset="-78"/>
+              </a:rPr>
+              <a:t>rezultati</a:t>
+            </a:r>
+            <a:r>
+              <a:rPr lang="en-US" sz="2400" dirty="0">
+                <a:ea typeface="Al Bayan Plain" charset="-78"/>
+                <a:cs typeface="Al Bayan Plain" charset="-78"/>
+              </a:rPr>
+              <a:t>:</a:t>
+            </a:r>
           </a:p>
         </p:txBody>
       </p:sp>
@@ -5495,27 +6150,7 @@
             <a:pPr algn="just"/>
             <a:r>
               <a:rPr lang="sr-Latn-RS" sz="2400" dirty="0"/>
-              <a:t>Trenutna arhitektura za rešavanje problema sa izuzetno velikom tačnošću prepoznaje lica na video snimcima i slikama. Iako je korišćena YoloV5 mreža sa srednjim brojem parameteara (nešto više </a:t>
-            </a:r>
-            <a:r>
-              <a:rPr lang="sr-Latn-RS" sz="2400" dirty="0" smtClean="0"/>
-              <a:t>od </a:t>
-            </a:r>
-            <a:r>
-              <a:rPr lang="sr-Latn-RS" sz="2400" dirty="0"/>
-              <a:t>20 miliona), model je nakon 20 epoha treninga dostigao preko 90% mAP na validacionom skupu podataka. Nakon ovih 20 epoha počela je stagnacija modela, te se može zaključiti da je model </a:t>
-            </a:r>
-            <a:r>
-              <a:rPr lang="sr-Latn-RS" sz="2400" dirty="0" smtClean="0"/>
-              <a:t>naučio </a:t>
-            </a:r>
-            <a:r>
-              <a:rPr lang="sr-Latn-RS" sz="2400" dirty="0"/>
-              <a:t>većinu bitnih stvari koje je uspeo iz datih podataka, te bi trebalo pokušati druge načine za unapređenje</a:t>
-            </a:r>
-            <a:r>
-              <a:rPr lang="sr-Latn-RS" sz="2400" dirty="0" smtClean="0"/>
-              <a:t>.</a:t>
+              <a:t>Trenutna arhitektura za rešavanje problema sa izuzetno velikom tačnošću prepoznaje lica na video snimcima i slikama. Iako je korišćena YoloV5 mreža sa srednjim brojem parametara (nešto više od 20 miliona), model je nakon 20 epoha treninga dostigao preko 90% mAP na validacionom skupu podataka. Nakon ovih 20 epoha počela je stagnacija modela, te se može zaključiti da je model naučio većinu bitnih stvari koje je uspeo iz datih podataka, te bi trebalo pokušati druge načine za unapređenje.</a:t>
             </a:r>
           </a:p>
           <a:p>
@@ -5525,16 +6160,12 @@
           <a:p>
             <a:pPr algn="just"/>
             <a:r>
-              <a:rPr lang="en-US" sz="2400" dirty="0" err="1" smtClean="0"/>
+              <a:rPr lang="en-US" sz="2400" dirty="0" err="1"/>
               <a:t>Iako</a:t>
             </a:r>
             <a:r>
-              <a:rPr lang="en-US" sz="2400" dirty="0" smtClean="0"/>
-              <a:t> </a:t>
-            </a:r>
-            <a:r>
-              <a:rPr lang="en-US" sz="2400" dirty="0"/>
-              <a:t>je </a:t>
+              <a:rPr lang="en-US" sz="2400" dirty="0"/>
+              <a:t> je </a:t>
             </a:r>
             <a:r>
               <a:rPr lang="en-US" sz="2400" dirty="0" err="1"/>
@@ -5641,27 +6272,23 @@
               <a:t>. </a:t>
             </a:r>
             <a:r>
-              <a:rPr lang="sr-Latn-RS" sz="2400" dirty="0" smtClean="0"/>
+              <a:rPr lang="sr-Latn-RS" sz="2400" dirty="0"/>
               <a:t>Umesto korišćene</a:t>
             </a:r>
             <a:r>
-              <a:rPr lang="en-US" sz="2400" dirty="0" smtClean="0"/>
-              <a:t> </a:t>
-            </a:r>
-            <a:r>
-              <a:rPr lang="en-US" sz="2400" dirty="0"/>
-              <a:t>YoloV5-M </a:t>
-            </a:r>
-            <a:r>
-              <a:rPr lang="en-US" sz="2400" dirty="0" err="1" smtClean="0"/>
+              <a:rPr lang="en-US" sz="2400" dirty="0"/>
+              <a:t> YoloV5-M </a:t>
+            </a:r>
+            <a:r>
+              <a:rPr lang="en-US" sz="2400" dirty="0" err="1"/>
               <a:t>mrež</a:t>
             </a:r>
             <a:r>
-              <a:rPr lang="sr-Latn-RS" sz="2400" dirty="0" smtClean="0"/>
+              <a:rPr lang="sr-Latn-RS" sz="2400" dirty="0"/>
               <a:t>e</a:t>
             </a:r>
             <a:r>
-              <a:rPr lang="en-US" sz="2400" dirty="0" smtClean="0"/>
+              <a:rPr lang="en-US" sz="2400" dirty="0"/>
               <a:t> </a:t>
             </a:r>
             <a:r>
@@ -5681,27 +6308,19 @@
               <a:t> </a:t>
             </a:r>
             <a:r>
-              <a:rPr lang="en-US" sz="2400" dirty="0" err="1" smtClean="0"/>
+              <a:rPr lang="en-US" sz="2400" dirty="0" err="1"/>
               <a:t>parametara</a:t>
             </a:r>
             <a:r>
-              <a:rPr lang="sr-Latn-RS" sz="2400" dirty="0" smtClean="0"/>
-              <a:t>,</a:t>
-            </a:r>
-            <a:r>
               <a:rPr lang="sr-Latn-RS" sz="2400" dirty="0"/>
-              <a:t> </a:t>
-            </a:r>
-            <a:r>
-              <a:rPr lang="sr-Latn-RS" sz="2400" dirty="0" smtClean="0"/>
-              <a:t>k</a:t>
-            </a:r>
-            <a:r>
-              <a:rPr lang="en-US" sz="2400" dirty="0" err="1" smtClean="0"/>
+              <a:t>, k</a:t>
+            </a:r>
+            <a:r>
+              <a:rPr lang="en-US" sz="2400" dirty="0" err="1"/>
               <a:t>ao</a:t>
             </a:r>
             <a:r>
-              <a:rPr lang="en-US" sz="2400" dirty="0" smtClean="0"/>
+              <a:rPr lang="en-US" sz="2400" dirty="0"/>
               <a:t> </a:t>
             </a:r>
             <a:r>
@@ -5894,67 +6513,163 @@
             </a:r>
             <a:r>
               <a:rPr lang="en-US" sz="2400" dirty="0"/>
+              <a:t> u tom</a:t>
+            </a:r>
+            <a:r>
+              <a:rPr lang="sr-Latn-RS" sz="2400" dirty="0"/>
+              <a:t> </a:t>
+            </a:r>
+            <a:r>
+              <a:rPr lang="en-US" sz="2400" dirty="0" err="1"/>
+              <a:t>pokušaju</a:t>
+            </a:r>
+            <a:r>
+              <a:rPr lang="en-US" sz="2400" dirty="0"/>
+              <a:t> </a:t>
+            </a:r>
+            <a:r>
+              <a:rPr lang="en-US" sz="2400" dirty="0" err="1"/>
+              <a:t>sprečila</a:t>
+            </a:r>
+            <a:r>
+              <a:rPr lang="en-US" sz="2400" dirty="0"/>
+              <a:t> </a:t>
+            </a:r>
+            <a:r>
+              <a:rPr lang="en-US" sz="2400" dirty="0" err="1"/>
+              <a:t>hardverska</a:t>
+            </a:r>
+            <a:r>
+              <a:rPr lang="en-US" sz="2400" dirty="0"/>
+              <a:t> </a:t>
+            </a:r>
+            <a:r>
+              <a:rPr lang="en-US" sz="2400" dirty="0" err="1"/>
+              <a:t>ograničenja</a:t>
+            </a:r>
+            <a:r>
+              <a:rPr lang="en-US" sz="2400" dirty="0"/>
+              <a:t>. Pored </a:t>
+            </a:r>
+            <a:r>
+              <a:rPr lang="en-US" sz="2400" dirty="0" err="1"/>
+              <a:t>ovog</a:t>
+            </a:r>
+            <a:r>
+              <a:rPr lang="en-US" sz="2400" dirty="0"/>
+              <a:t> </a:t>
+            </a:r>
+            <a:r>
+              <a:rPr lang="en-US" sz="2400" dirty="0" err="1"/>
+              <a:t>poboljšanja</a:t>
+            </a:r>
+            <a:r>
+              <a:rPr lang="en-US" sz="2400" dirty="0"/>
+              <a:t> </a:t>
+            </a:r>
+            <a:r>
+              <a:rPr lang="en-US" sz="2400" dirty="0" err="1"/>
+              <a:t>postoje</a:t>
+            </a:r>
+            <a:r>
+              <a:rPr lang="en-US" sz="2400" dirty="0"/>
+              <a:t> </a:t>
+            </a:r>
+            <a:r>
+              <a:rPr lang="en-US" sz="2400" dirty="0" err="1"/>
+              <a:t>još</a:t>
+            </a:r>
+            <a:r>
+              <a:rPr lang="en-US" sz="2400" dirty="0"/>
+              <a:t> </a:t>
+            </a:r>
+            <a:r>
+              <a:rPr lang="en-US" sz="2400" dirty="0" err="1"/>
+              <a:t>i</a:t>
+            </a:r>
+            <a:r>
+              <a:rPr lang="en-US" sz="2400" dirty="0"/>
+              <a:t> </a:t>
+            </a:r>
+            <a:r>
+              <a:rPr lang="en-US" sz="2400" dirty="0" err="1"/>
+              <a:t>opcije</a:t>
+            </a:r>
+            <a:r>
+              <a:rPr lang="en-US" sz="2400" dirty="0"/>
+              <a:t> </a:t>
+            </a:r>
+            <a:r>
+              <a:rPr lang="en-US" sz="2400" dirty="0" err="1"/>
+              <a:t>za</a:t>
+            </a:r>
+            <a:r>
+              <a:rPr lang="en-US" sz="2400" dirty="0"/>
+              <a:t> </a:t>
+            </a:r>
+            <a:r>
+              <a:rPr lang="en-US" sz="2400" dirty="0" err="1"/>
+              <a:t>poboljšanja</a:t>
+            </a:r>
+            <a:r>
+              <a:rPr lang="en-US" sz="2400" dirty="0"/>
               <a:t> u </a:t>
             </a:r>
             <a:r>
-              <a:rPr lang="en-US" sz="2400" dirty="0" smtClean="0"/>
-              <a:t>tom</a:t>
-            </a:r>
-            <a:r>
-              <a:rPr lang="sr-Latn-RS" sz="2400" dirty="0" smtClean="0"/>
-              <a:t> </a:t>
-            </a:r>
-            <a:r>
-              <a:rPr lang="en-US" sz="2400" dirty="0" err="1" smtClean="0"/>
-              <a:t>pokušaju</a:t>
-            </a:r>
-            <a:r>
-              <a:rPr lang="en-US" sz="2400" dirty="0" smtClean="0"/>
-              <a:t> </a:t>
-            </a:r>
-            <a:r>
-              <a:rPr lang="en-US" sz="2400" dirty="0" err="1"/>
-              <a:t>sprečila</a:t>
-            </a:r>
-            <a:r>
-              <a:rPr lang="en-US" sz="2400" dirty="0"/>
-              <a:t> </a:t>
-            </a:r>
-            <a:r>
-              <a:rPr lang="en-US" sz="2400" dirty="0" err="1"/>
-              <a:t>hardverska</a:t>
-            </a:r>
-            <a:r>
-              <a:rPr lang="en-US" sz="2400" dirty="0"/>
-              <a:t> </a:t>
-            </a:r>
-            <a:r>
-              <a:rPr lang="en-US" sz="2400" dirty="0" err="1"/>
-              <a:t>ograničenja</a:t>
-            </a:r>
-            <a:r>
-              <a:rPr lang="en-US" sz="2400" dirty="0"/>
-              <a:t>. Pored </a:t>
-            </a:r>
-            <a:r>
-              <a:rPr lang="en-US" sz="2400" dirty="0" err="1"/>
-              <a:t>ovog</a:t>
-            </a:r>
-            <a:r>
-              <a:rPr lang="en-US" sz="2400" dirty="0"/>
-              <a:t> </a:t>
-            </a:r>
-            <a:r>
-              <a:rPr lang="en-US" sz="2400" dirty="0" err="1"/>
-              <a:t>poboljšanja</a:t>
-            </a:r>
-            <a:r>
-              <a:rPr lang="en-US" sz="2400" dirty="0"/>
-              <a:t> </a:t>
-            </a:r>
-            <a:r>
-              <a:rPr lang="en-US" sz="2400" dirty="0" err="1"/>
-              <a:t>postoje</a:t>
+              <a:rPr lang="en-US" sz="2400" dirty="0" err="1"/>
+              <a:t>vidu</a:t>
+            </a:r>
+            <a:r>
+              <a:rPr lang="en-US" sz="2400" dirty="0"/>
+              <a:t> </a:t>
+            </a:r>
+            <a:r>
+              <a:rPr lang="en-US" sz="2400" dirty="0" err="1"/>
+              <a:t>podataka</a:t>
+            </a:r>
+            <a:r>
+              <a:rPr lang="en-US" sz="2400" dirty="0"/>
+              <a:t> </a:t>
+            </a:r>
+            <a:r>
+              <a:rPr lang="en-US" sz="2400" dirty="0" err="1"/>
+              <a:t>koji</a:t>
+            </a:r>
+            <a:r>
+              <a:rPr lang="sr-Latn-RS" sz="2400" dirty="0"/>
+              <a:t> </a:t>
+            </a:r>
+            <a:r>
+              <a:rPr lang="en-US" sz="2400" dirty="0"/>
+              <a:t>se </a:t>
+            </a:r>
+            <a:r>
+              <a:rPr lang="en-US" sz="2400" dirty="0" err="1"/>
+              <a:t>konzumiraju</a:t>
+            </a:r>
+            <a:r>
+              <a:rPr lang="en-US" sz="2400" dirty="0"/>
+              <a:t>. </a:t>
+            </a:r>
+            <a:r>
+              <a:rPr lang="en-US" sz="2400" dirty="0" err="1"/>
+              <a:t>Jedna</a:t>
+            </a:r>
+            <a:r>
+              <a:rPr lang="en-US" sz="2400" dirty="0"/>
+              <a:t> </a:t>
+            </a:r>
+            <a:r>
+              <a:rPr lang="en-US" sz="2400" dirty="0" err="1"/>
+              <a:t>opcija</a:t>
+            </a:r>
+            <a:r>
+              <a:rPr lang="en-US" sz="2400" dirty="0"/>
+              <a:t> je </a:t>
+            </a:r>
+            <a:r>
+              <a:rPr lang="en-US" sz="2400" dirty="0" err="1"/>
+              <a:t>pronaći</a:t>
             </a:r>
             <a:r>
               <a:rPr lang="en-US" sz="2400" dirty="0"/>
@@ -5970,46 +6685,6 @@
             </a:r>
             <a:r>
               <a:rPr lang="en-US" sz="2400" dirty="0" err="1"/>
-              <a:t>i</a:t>
-            </a:r>
-            <a:r>
-              <a:rPr lang="en-US" sz="2400" dirty="0"/>
-              <a:t> </a:t>
-            </a:r>
-            <a:r>
-              <a:rPr lang="en-US" sz="2400" dirty="0" err="1"/>
-              <a:t>opcije</a:t>
-            </a:r>
-            <a:r>
-              <a:rPr lang="en-US" sz="2400" dirty="0"/>
-              <a:t> </a:t>
-            </a:r>
-            <a:r>
-              <a:rPr lang="en-US" sz="2400" dirty="0" err="1"/>
-              <a:t>za</a:t>
-            </a:r>
-            <a:r>
-              <a:rPr lang="en-US" sz="2400" dirty="0"/>
-              <a:t> </a:t>
-            </a:r>
-            <a:r>
-              <a:rPr lang="en-US" sz="2400" dirty="0" err="1"/>
-              <a:t>poboljšanja</a:t>
-            </a:r>
-            <a:r>
-              <a:rPr lang="en-US" sz="2400" dirty="0"/>
-              <a:t> u </a:t>
-            </a:r>
-            <a:r>
-              <a:rPr lang="en-US" sz="2400" dirty="0" err="1"/>
-              <a:t>vidu</a:t>
-            </a:r>
-            <a:r>
-              <a:rPr lang="en-US" sz="2400" dirty="0"/>
-              <a:t> </a:t>
-            </a:r>
-            <a:r>
-              <a:rPr lang="en-US" sz="2400" dirty="0" err="1"/>
               <a:t>podataka</a:t>
             </a:r>
             <a:r>
@@ -6017,36 +6692,95 @@
               <a:t> </a:t>
             </a:r>
             <a:r>
-              <a:rPr lang="en-US" sz="2400" dirty="0" err="1" smtClean="0"/>
+              <a:rPr lang="en-US" sz="2400" dirty="0" err="1"/>
+              <a:t>kod</a:t>
+            </a:r>
+            <a:r>
+              <a:rPr lang="en-US" sz="2400" dirty="0"/>
+              <a:t> </a:t>
+            </a:r>
+            <a:r>
+              <a:rPr lang="en-US" sz="2400" dirty="0" err="1"/>
               <a:t>koji</a:t>
             </a:r>
             <a:r>
-              <a:rPr lang="sr-Latn-RS" sz="2400" dirty="0" smtClean="0"/>
-              <a:t> </a:t>
-            </a:r>
-            <a:r>
-              <a:rPr lang="en-US" sz="2400" dirty="0" smtClean="0"/>
-              <a:t>se </a:t>
-            </a:r>
-            <a:r>
-              <a:rPr lang="en-US" sz="2400" dirty="0" err="1"/>
-              <a:t>konzumiraju</a:t>
-            </a:r>
-            <a:r>
-              <a:rPr lang="en-US" sz="2400" dirty="0"/>
-              <a:t>. </a:t>
-            </a:r>
-            <a:r>
-              <a:rPr lang="en-US" sz="2400" dirty="0" err="1"/>
-              <a:t>Jedna</a:t>
-            </a:r>
-            <a:r>
-              <a:rPr lang="en-US" sz="2400" dirty="0"/>
-              <a:t> </a:t>
-            </a:r>
-            <a:r>
-              <a:rPr lang="en-US" sz="2400" dirty="0" err="1"/>
-              <a:t>opcija</a:t>
+              <a:rPr lang="sr-Latn-RS" sz="2400" dirty="0"/>
+              <a:t>h</a:t>
+            </a:r>
+            <a:r>
+              <a:rPr lang="en-US" sz="2400" dirty="0"/>
+              <a:t> </a:t>
+            </a:r>
+            <a:r>
+              <a:rPr lang="en-US" sz="2400" dirty="0" err="1"/>
+              <a:t>su</a:t>
+            </a:r>
+            <a:r>
+              <a:rPr lang="en-US" sz="2400" dirty="0"/>
+              <a:t> </a:t>
+            </a:r>
+          </a:p>
+          <a:p>
+            <a:pPr algn="just"/>
+            <a:r>
+              <a:rPr lang="en-US" sz="2400" dirty="0" err="1"/>
+              <a:t>lica</a:t>
+            </a:r>
+            <a:r>
+              <a:rPr lang="en-US" sz="2400" dirty="0"/>
+              <a:t> </a:t>
+            </a:r>
+            <a:r>
+              <a:rPr lang="en-US" sz="2400" dirty="0" err="1"/>
+              <a:t>više</a:t>
+            </a:r>
+            <a:r>
+              <a:rPr lang="en-US" sz="2400" dirty="0"/>
+              <a:t> </a:t>
+            </a:r>
+            <a:r>
+              <a:rPr lang="en-US" sz="2400" dirty="0" err="1"/>
+              <a:t>udaljena</a:t>
+            </a:r>
+            <a:r>
+              <a:rPr lang="en-US" sz="2400" dirty="0"/>
+              <a:t> od </a:t>
+            </a:r>
+            <a:r>
+              <a:rPr lang="en-US" sz="2400" dirty="0" err="1"/>
+              <a:t>kamere</a:t>
+            </a:r>
+            <a:r>
+              <a:rPr lang="en-US" sz="2400" dirty="0"/>
+              <a:t> </a:t>
+            </a:r>
+            <a:r>
+              <a:rPr lang="en-US" sz="2400" dirty="0" err="1"/>
+              <a:t>ili</a:t>
+            </a:r>
+            <a:r>
+              <a:rPr lang="en-US" sz="2400" dirty="0"/>
+              <a:t> </a:t>
+            </a:r>
+            <a:r>
+              <a:rPr lang="en-US" sz="2400" dirty="0" err="1"/>
+              <a:t>lošije</a:t>
+            </a:r>
+            <a:r>
+              <a:rPr lang="en-US" sz="2400" dirty="0"/>
+              <a:t> </a:t>
+            </a:r>
+            <a:r>
+              <a:rPr lang="en-US" sz="2400" dirty="0" err="1"/>
+              <a:t>osvetljena</a:t>
+            </a:r>
+            <a:r>
+              <a:rPr lang="en-US" sz="2400" dirty="0"/>
+              <a:t>, </a:t>
+            </a:r>
+            <a:r>
+              <a:rPr lang="en-US" sz="2400" dirty="0" err="1"/>
+              <a:t>dok</a:t>
             </a:r>
             <a:r>
               <a:rPr lang="en-US" sz="2400" dirty="0"/>
@@ -6054,125 +6788,6 @@
             </a:r>
             <a:r>
               <a:rPr lang="en-US" sz="2400" dirty="0" err="1"/>
-              <a:t>pronaći</a:t>
-            </a:r>
-            <a:r>
-              <a:rPr lang="en-US" sz="2400" dirty="0"/>
-              <a:t> </a:t>
-            </a:r>
-            <a:r>
-              <a:rPr lang="en-US" sz="2400" dirty="0" err="1"/>
-              <a:t>još</a:t>
-            </a:r>
-            <a:r>
-              <a:rPr lang="en-US" sz="2400" dirty="0"/>
-              <a:t> </a:t>
-            </a:r>
-            <a:r>
-              <a:rPr lang="en-US" sz="2400" dirty="0" err="1"/>
-              <a:t>podataka</a:t>
-            </a:r>
-            <a:r>
-              <a:rPr lang="en-US" sz="2400" dirty="0"/>
-              <a:t> </a:t>
-            </a:r>
-            <a:r>
-              <a:rPr lang="en-US" sz="2400" dirty="0" err="1"/>
-              <a:t>kod</a:t>
-            </a:r>
-            <a:r>
-              <a:rPr lang="en-US" sz="2400" dirty="0"/>
-              <a:t> </a:t>
-            </a:r>
-            <a:r>
-              <a:rPr lang="en-US" sz="2400" dirty="0" err="1" smtClean="0"/>
-              <a:t>koji</a:t>
-            </a:r>
-            <a:r>
-              <a:rPr lang="sr-Latn-RS" sz="2400" dirty="0" smtClean="0"/>
-              <a:t>h</a:t>
-            </a:r>
-            <a:r>
-              <a:rPr lang="en-US" sz="2400" dirty="0" smtClean="0"/>
-              <a:t> </a:t>
-            </a:r>
-            <a:r>
-              <a:rPr lang="en-US" sz="2400" dirty="0" err="1"/>
-              <a:t>su</a:t>
-            </a:r>
-            <a:r>
-              <a:rPr lang="en-US" sz="2400" dirty="0"/>
-              <a:t> </a:t>
-            </a:r>
-          </a:p>
-          <a:p>
-            <a:pPr algn="just"/>
-            <a:r>
-              <a:rPr lang="en-US" sz="2400" dirty="0" err="1"/>
-              <a:t>lica</a:t>
-            </a:r>
-            <a:r>
-              <a:rPr lang="en-US" sz="2400" dirty="0"/>
-              <a:t> </a:t>
-            </a:r>
-            <a:r>
-              <a:rPr lang="en-US" sz="2400" dirty="0" err="1"/>
-              <a:t>više</a:t>
-            </a:r>
-            <a:r>
-              <a:rPr lang="en-US" sz="2400" dirty="0"/>
-              <a:t> </a:t>
-            </a:r>
-            <a:r>
-              <a:rPr lang="en-US" sz="2400" dirty="0" err="1"/>
-              <a:t>udaljena</a:t>
-            </a:r>
-            <a:r>
-              <a:rPr lang="en-US" sz="2400" dirty="0"/>
-              <a:t> od </a:t>
-            </a:r>
-            <a:r>
-              <a:rPr lang="en-US" sz="2400" dirty="0" err="1"/>
-              <a:t>kamere</a:t>
-            </a:r>
-            <a:r>
-              <a:rPr lang="en-US" sz="2400" dirty="0"/>
-              <a:t> </a:t>
-            </a:r>
-            <a:r>
-              <a:rPr lang="en-US" sz="2400" dirty="0" err="1"/>
-              <a:t>ili</a:t>
-            </a:r>
-            <a:r>
-              <a:rPr lang="en-US" sz="2400" dirty="0"/>
-              <a:t> </a:t>
-            </a:r>
-            <a:r>
-              <a:rPr lang="en-US" sz="2400" dirty="0" err="1"/>
-              <a:t>lošije</a:t>
-            </a:r>
-            <a:r>
-              <a:rPr lang="en-US" sz="2400" dirty="0"/>
-              <a:t> </a:t>
-            </a:r>
-            <a:r>
-              <a:rPr lang="en-US" sz="2400" dirty="0" err="1"/>
-              <a:t>osvetljena</a:t>
-            </a:r>
-            <a:r>
-              <a:rPr lang="en-US" sz="2400" dirty="0"/>
-              <a:t>, </a:t>
-            </a:r>
-            <a:r>
-              <a:rPr lang="en-US" sz="2400" dirty="0" err="1"/>
-              <a:t>dok</a:t>
-            </a:r>
-            <a:r>
-              <a:rPr lang="en-US" sz="2400" dirty="0"/>
-              <a:t> je </a:t>
-            </a:r>
-            <a:r>
-              <a:rPr lang="en-US" sz="2400" dirty="0" err="1"/>
               <a:t>druga</a:t>
             </a:r>
             <a:r>
@@ -6243,7 +6858,6 @@
               <a:rPr lang="en-US" sz="2400" dirty="0"/>
               <a:t>.</a:t>
             </a:r>
-            <a:endParaRPr lang="en-US" sz="2400" dirty="0"/>
           </a:p>
         </p:txBody>
       </p:sp>
@@ -6300,16 +6914,32 @@
           <a:lstStyle/>
           <a:p>
             <a:pPr algn="just"/>
-            <a:r>
-              <a:rPr lang="en-US" sz="2400" dirty="0"/>
-              <a:t/>
-            </a:r>
             <a:br>
               <a:rPr lang="en-US" sz="2400" dirty="0"/>
             </a:br>
             <a:r>
               <a:rPr lang="sr-Latn-RS" sz="2400" dirty="0"/>
-              <a:t>U skupu podataka ukupno ima 875-880 slika, gde je nakon augmentiranja došdo do ukupno 1775 slika, od čega je z</a:t>
+              <a:t>U skupu podataka ukupno ima 875-880 slika, gde je nakon </a:t>
+            </a:r>
+            <a:r>
+              <a:rPr lang="sr-Latn-RS" sz="2400" dirty="0" err="1"/>
+              <a:t>augmentiranja</a:t>
+            </a:r>
+            <a:r>
+              <a:rPr lang="sr-Latn-RS" sz="2400" dirty="0"/>
+              <a:t> </a:t>
+            </a:r>
+            <a:r>
+              <a:rPr lang="sr-Latn-RS" sz="2400" dirty="0" err="1"/>
+              <a:t>doš</a:t>
+            </a:r>
+            <a:r>
+              <a:rPr lang="en-US" sz="2400" dirty="0"/>
+              <a:t>l</a:t>
+            </a:r>
+            <a:r>
+              <a:rPr lang="sr-Latn-RS" sz="2400" dirty="0"/>
+              <a:t>o do ukupno 1775 slika, od čega je z</a:t>
             </a:r>
             <a:r>
               <a:rPr lang="en-US" sz="2400" dirty="0"/>
@@ -6749,7 +7379,6 @@
               <a:rPr lang="en-US" sz="2400" dirty="0"/>
               <a:t>.</a:t>
             </a:r>
-            <a:endParaRPr lang="en-US" sz="2400" dirty="0"/>
           </a:p>
         </p:txBody>
       </p:sp>
@@ -6844,10 +7473,6 @@
               <a:rPr lang="en-US" sz="2400" dirty="0"/>
               <a:t>. </a:t>
             </a:r>
-            <a:r>
-              <a:rPr lang="sr-Latn-RS" sz="2400" dirty="0"/>
-              <a:t/>
-            </a:r>
             <a:br>
               <a:rPr lang="sr-Latn-RS" sz="2400" dirty="0"/>
             </a:br>
@@ -6923,10 +7548,6 @@
               <a:rPr lang="en-US" sz="2400" dirty="0"/>
               <a:t>. </a:t>
             </a:r>
-            <a:r>
-              <a:rPr lang="sr-Latn-RS" sz="2400" dirty="0"/>
-              <a:t/>
-            </a:r>
             <a:br>
               <a:rPr lang="sr-Latn-RS" sz="2400" dirty="0"/>
             </a:br>
@@ -7725,10 +8346,6 @@
             <a:r>
               <a:rPr lang="en-US" sz="2400" dirty="0"/>
               <a:t> lice. </a:t>
-            </a:r>
-            <a:r>
-              <a:rPr lang="sr-Latn-RS" sz="2400" dirty="0"/>
-              <a:t/>
             </a:r>
             <a:br>
               <a:rPr lang="sr-Latn-RS" sz="2400" dirty="0"/>
@@ -7923,14 +8540,14 @@
           <p:nvPr>
             <p:extLst>
               <p:ext uri="{D42A27DB-BD31-4B8C-83A1-F6EECF244321}">
-                <p14:modId xmlns:p14="http://schemas.microsoft.com/office/powerpoint/2010/main" val="1016163885"/>
+                <p14:modId xmlns:p14="http://schemas.microsoft.com/office/powerpoint/2010/main" val="793241386"/>
               </p:ext>
             </p:extLst>
           </p:nvPr>
         </p:nvGraphicFramePr>
         <p:xfrm>
-          <a:off x="16436879" y="26802801"/>
-          <a:ext cx="12759875" cy="5125568"/>
+          <a:off x="14558337" y="23694181"/>
+          <a:ext cx="15502563" cy="8099461"/>
         </p:xfrm>
         <a:graphic>
           <a:graphicData uri="http://schemas.openxmlformats.org/drawingml/2006/table">
@@ -7939,35 +8556,35 @@
                 <a:tableStyleId>{616DA210-FB5B-4158-B5E0-FEB733F419BA}</a:tableStyleId>
               </a:tblPr>
               <a:tblGrid>
-                <a:gridCol w="5597073">
+                <a:gridCol w="6800143">
                   <a:extLst>
                     <a:ext uri="{9D8B030D-6E8A-4147-A177-3AD203B41FA5}">
                       <a16:colId xmlns:a16="http://schemas.microsoft.com/office/drawing/2014/main" val="3455713678"/>
                     </a:ext>
                   </a:extLst>
                 </a:gridCol>
-                <a:gridCol w="1676400">
+                <a:gridCol w="2036736">
                   <a:extLst>
                     <a:ext uri="{9D8B030D-6E8A-4147-A177-3AD203B41FA5}">
                       <a16:colId xmlns:a16="http://schemas.microsoft.com/office/drawing/2014/main" val="3781696750"/>
                     </a:ext>
                   </a:extLst>
                 </a:gridCol>
-                <a:gridCol w="1752600">
+                <a:gridCol w="2129315">
                   <a:extLst>
                     <a:ext uri="{9D8B030D-6E8A-4147-A177-3AD203B41FA5}">
                       <a16:colId xmlns:a16="http://schemas.microsoft.com/office/drawing/2014/main" val="4126209446"/>
                     </a:ext>
                   </a:extLst>
                 </a:gridCol>
-                <a:gridCol w="1905000">
+                <a:gridCol w="2314473">
                   <a:extLst>
                     <a:ext uri="{9D8B030D-6E8A-4147-A177-3AD203B41FA5}">
                       <a16:colId xmlns:a16="http://schemas.microsoft.com/office/drawing/2014/main" val="1436186651"/>
                     </a:ext>
                   </a:extLst>
                 </a:gridCol>
-                <a:gridCol w="1828802">
+                <a:gridCol w="2221896">
                   <a:extLst>
                     <a:ext uri="{9D8B030D-6E8A-4147-A177-3AD203B41FA5}">
                       <a16:colId xmlns:a16="http://schemas.microsoft.com/office/drawing/2014/main" val="961325807"/>
@@ -7975,7 +8592,7 @@
                   </a:extLst>
                 </a:gridCol>
               </a:tblGrid>
-              <a:tr h="1107212">
+              <a:tr h="1267639">
                 <a:tc>
                   <a:txBody>
                     <a:bodyPr/>
@@ -8013,7 +8630,7 @@
                         <a:defRPr/>
                       </a:pPr>
                       <a:r>
-                        <a:rPr lang="en-US" sz="4400" dirty="0" smtClean="0"/>
+                        <a:rPr lang="en-US" sz="4400" dirty="0"/>
                         <a:t>YOLOv5-S</a:t>
                       </a:r>
                     </a:p>
@@ -8057,7 +8674,7 @@
                         <a:defRPr/>
                       </a:pPr>
                       <a:r>
-                        <a:rPr lang="en-US" sz="4400" dirty="0" smtClean="0"/>
+                        <a:rPr lang="en-US" sz="4400" dirty="0"/>
                         <a:t>YOLOv5-M</a:t>
                       </a:r>
                     </a:p>
@@ -8084,7 +8701,7 @@
                   </a:ext>
                 </a:extLst>
               </a:tr>
-              <a:tr h="1153236">
+              <a:tr h="1445391">
                 <a:tc>
                   <a:txBody>
                     <a:bodyPr/>
@@ -8098,15 +8715,15 @@
                         <a:buNone/>
                       </a:pPr>
                       <a:r>
-                        <a:rPr lang="en-US" sz="4400" dirty="0" err="1" smtClean="0"/>
+                        <a:rPr lang="en-US" sz="4400" dirty="0" err="1"/>
                         <a:t>Broj</a:t>
                       </a:r>
                       <a:r>
-                        <a:rPr lang="en-US" sz="4400" dirty="0" smtClean="0"/>
+                        <a:rPr lang="en-US" sz="4400" dirty="0"/>
                         <a:t> </a:t>
                       </a:r>
                       <a:r>
-                        <a:rPr lang="en-US" sz="4400" dirty="0" err="1" smtClean="0"/>
+                        <a:rPr lang="en-US" sz="4400" dirty="0" err="1"/>
                         <a:t>epoha</a:t>
                       </a:r>
                       <a:endParaRPr lang="en-US" sz="4400" dirty="0"/>
@@ -8127,10 +8744,9 @@
                         <a:buNone/>
                       </a:pPr>
                       <a:r>
-                        <a:rPr lang="en-US" sz="4400" dirty="0" smtClean="0"/>
+                        <a:rPr lang="en-US" sz="4400" dirty="0"/>
                         <a:t>10</a:t>
                       </a:r>
-                      <a:endParaRPr lang="en-US" sz="4400" dirty="0"/>
                     </a:p>
                   </a:txBody>
                   <a:tcPr/>
@@ -8148,10 +8764,9 @@
                         <a:buNone/>
                       </a:pPr>
                       <a:r>
-                        <a:rPr lang="en-US" sz="4400" dirty="0" smtClean="0"/>
+                        <a:rPr lang="en-US" sz="4400" dirty="0"/>
                         <a:t>20</a:t>
                       </a:r>
-                      <a:endParaRPr lang="en-US" sz="4400" dirty="0"/>
                     </a:p>
                   </a:txBody>
                   <a:tcPr/>
@@ -8169,10 +8784,9 @@
                         <a:buNone/>
                       </a:pPr>
                       <a:r>
-                        <a:rPr lang="en-US" sz="4400" dirty="0" smtClean="0"/>
+                        <a:rPr lang="en-US" sz="4400" dirty="0"/>
                         <a:t>10</a:t>
                       </a:r>
-                      <a:endParaRPr lang="en-US" sz="4400" dirty="0"/>
                     </a:p>
                   </a:txBody>
                   <a:tcPr/>
@@ -8190,10 +8804,9 @@
                         <a:buNone/>
                       </a:pPr>
                       <a:r>
-                        <a:rPr lang="en-US" sz="4400" dirty="0" smtClean="0"/>
+                        <a:rPr lang="en-US" sz="4400" dirty="0"/>
                         <a:t>20</a:t>
                       </a:r>
-                      <a:endParaRPr lang="en-US" sz="4400" dirty="0"/>
                     </a:p>
                   </a:txBody>
                   <a:tcPr/>
@@ -8204,7 +8817,7 @@
                   </a:ext>
                 </a:extLst>
               </a:tr>
-              <a:tr h="1385652">
+              <a:tr h="1795477">
                 <a:tc>
                   <a:txBody>
                     <a:bodyPr/>
@@ -8228,22 +8841,22 @@
                         <a:defRPr/>
                       </a:pPr>
                       <a:r>
-                        <a:rPr lang="en-US" sz="4400" dirty="0" err="1" smtClean="0"/>
+                        <a:rPr lang="en-US" sz="4400" dirty="0" err="1"/>
                         <a:t>Trajanje</a:t>
                       </a:r>
                       <a:r>
-                        <a:rPr lang="en-US" sz="4400" baseline="0" dirty="0" smtClean="0"/>
+                        <a:rPr lang="en-US" sz="4400" baseline="0" dirty="0"/>
                         <a:t> </a:t>
                       </a:r>
                       <a:r>
-                        <a:rPr lang="en-US" sz="4400" baseline="0" dirty="0" err="1" smtClean="0"/>
+                        <a:rPr lang="en-US" sz="4400" baseline="0" dirty="0" err="1"/>
                         <a:t>treninga</a:t>
                       </a:r>
                       <a:r>
-                        <a:rPr lang="en-US" sz="4400" baseline="0" dirty="0" smtClean="0"/>
+                        <a:rPr lang="en-US" sz="4400" baseline="0" dirty="0"/>
                         <a:t> (min)</a:t>
                       </a:r>
-                      <a:endParaRPr lang="en-US" sz="4400" dirty="0" smtClean="0"/>
+                      <a:endParaRPr lang="en-US" sz="4400" dirty="0"/>
                     </a:p>
                     <a:p>
                       <a:pPr marL="0" indent="0" algn="ctr">
@@ -8268,8 +8881,104 @@
                         <a:buNone/>
                       </a:pPr>
                       <a:r>
-                        <a:rPr lang="en-US" sz="4400" dirty="0" smtClean="0"/>
+                        <a:rPr lang="en-US" sz="4400" dirty="0"/>
                         <a:t>90</a:t>
+                      </a:r>
+                    </a:p>
+                  </a:txBody>
+                  <a:tcPr/>
+                </a:tc>
+                <a:tc>
+                  <a:txBody>
+                    <a:bodyPr/>
+                    <a:lstStyle/>
+                    <a:p>
+                      <a:pPr marL="0" indent="0" algn="ctr">
+                        <a:lnSpc>
+                          <a:spcPct val="150000"/>
+                        </a:lnSpc>
+                        <a:buFont typeface="+mj-lt"/>
+                        <a:buNone/>
+                      </a:pPr>
+                      <a:r>
+                        <a:rPr lang="en-US" sz="4400" dirty="0"/>
+                        <a:t>180</a:t>
+                      </a:r>
+                    </a:p>
+                  </a:txBody>
+                  <a:tcPr/>
+                </a:tc>
+                <a:tc>
+                  <a:txBody>
+                    <a:bodyPr/>
+                    <a:lstStyle/>
+                    <a:p>
+                      <a:pPr marL="0" indent="0" algn="ctr">
+                        <a:lnSpc>
+                          <a:spcPct val="150000"/>
+                        </a:lnSpc>
+                        <a:buFont typeface="+mj-lt"/>
+                        <a:buNone/>
+                      </a:pPr>
+                      <a:r>
+                        <a:rPr lang="en-US" sz="4400" dirty="0"/>
+                        <a:t>180</a:t>
+                      </a:r>
+                    </a:p>
+                  </a:txBody>
+                  <a:tcPr/>
+                </a:tc>
+                <a:tc>
+                  <a:txBody>
+                    <a:bodyPr/>
+                    <a:lstStyle/>
+                    <a:p>
+                      <a:pPr marL="0" indent="0" algn="ctr">
+                        <a:lnSpc>
+                          <a:spcPct val="150000"/>
+                        </a:lnSpc>
+                        <a:buFont typeface="+mj-lt"/>
+                        <a:buNone/>
+                      </a:pPr>
+                      <a:r>
+                        <a:rPr lang="en-US" sz="4400" dirty="0"/>
+                        <a:t>360</a:t>
+                      </a:r>
+                    </a:p>
+                  </a:txBody>
+                  <a:tcPr/>
+                </a:tc>
+                <a:extLst>
+                  <a:ext uri="{0D108BD9-81ED-4DB2-BD59-A6C34878D82A}">
+                    <a16:rowId xmlns:a16="http://schemas.microsoft.com/office/drawing/2014/main" val="3076418687"/>
+                  </a:ext>
+                </a:extLst>
+              </a:tr>
+              <a:tr h="1795477">
+                <a:tc>
+                  <a:txBody>
+                    <a:bodyPr/>
+                    <a:lstStyle/>
+                    <a:p>
+                      <a:pPr marL="0" indent="0" algn="ctr">
+                        <a:buFont typeface="+mj-lt"/>
+                        <a:buNone/>
+                      </a:pPr>
+                      <a:r>
+                        <a:rPr lang="en-US" sz="4400" dirty="0"/>
+                        <a:t>Mean average</a:t>
+                      </a:r>
+                      <a:r>
+                        <a:rPr lang="en-US" sz="4400" baseline="0" dirty="0"/>
+                        <a:t> precision (</a:t>
+                      </a:r>
+                      <a:r>
+                        <a:rPr lang="en-US" sz="4400" baseline="0" dirty="0" err="1"/>
+                        <a:t>mAP</a:t>
+                      </a:r>
+                      <a:r>
+                        <a:rPr lang="en-US" sz="4400" baseline="0" dirty="0"/>
+                        <a:t> .5)</a:t>
                       </a:r>
                       <a:endParaRPr lang="en-US" sz="4400" dirty="0"/>
                     </a:p>
@@ -8289,10 +8998,9 @@
                         <a:buNone/>
                       </a:pPr>
                       <a:r>
-                        <a:rPr lang="en-US" sz="4400" dirty="0" smtClean="0"/>
-                        <a:t>180</a:t>
+                        <a:rPr lang="en-US" sz="4400" dirty="0"/>
+                        <a:t>80%</a:t>
                       </a:r>
-                      <a:endParaRPr lang="en-US" sz="4400" dirty="0"/>
                     </a:p>
                   </a:txBody>
                   <a:tcPr/>
@@ -8310,10 +9018,9 @@
                         <a:buNone/>
                       </a:pPr>
                       <a:r>
-                        <a:rPr lang="en-US" sz="4400" dirty="0" smtClean="0"/>
-                        <a:t>180</a:t>
+                        <a:rPr lang="en-US" sz="4400" dirty="0"/>
+                        <a:t>88%</a:t>
                       </a:r>
-                      <a:endParaRPr lang="en-US" sz="4400" dirty="0"/>
                     </a:p>
                   </a:txBody>
                   <a:tcPr/>
@@ -8331,47 +9038,9 @@
                         <a:buNone/>
                       </a:pPr>
                       <a:r>
-                        <a:rPr lang="en-US" sz="4400" dirty="0" smtClean="0"/>
-                        <a:t>360</a:t>
+                        <a:rPr lang="en-US" sz="4400" dirty="0"/>
+                        <a:t>85%</a:t>
                       </a:r>
-                      <a:endParaRPr lang="en-US" sz="4400" dirty="0"/>
-                    </a:p>
-                  </a:txBody>
-                  <a:tcPr/>
-                </a:tc>
-                <a:extLst>
-                  <a:ext uri="{0D108BD9-81ED-4DB2-BD59-A6C34878D82A}">
-                    <a16:rowId xmlns:a16="http://schemas.microsoft.com/office/drawing/2014/main" val="3076418687"/>
-                  </a:ext>
-                </a:extLst>
-              </a:tr>
-              <a:tr h="1385652">
-                <a:tc>
-                  <a:txBody>
-                    <a:bodyPr/>
-                    <a:lstStyle/>
-                    <a:p>
-                      <a:pPr marL="0" indent="0" algn="ctr">
-                        <a:buFont typeface="+mj-lt"/>
-                        <a:buNone/>
-                      </a:pPr>
-                      <a:r>
-                        <a:rPr lang="en-US" sz="4400" dirty="0" smtClean="0"/>
-                        <a:t>Mean average</a:t>
-                      </a:r>
-                      <a:r>
-                        <a:rPr lang="en-US" sz="4400" baseline="0" dirty="0" smtClean="0"/>
-                        <a:t> precision (</a:t>
-                      </a:r>
-                      <a:r>
-                        <a:rPr lang="en-US" sz="4400" baseline="0" dirty="0" err="1" smtClean="0"/>
-                        <a:t>mPA</a:t>
-                      </a:r>
-                      <a:r>
-                        <a:rPr lang="en-US" sz="4400" baseline="0" dirty="0" smtClean="0"/>
-                        <a:t>)</a:t>
-                      </a:r>
-                      <a:endParaRPr lang="en-US" sz="4400" dirty="0"/>
                     </a:p>
                   </a:txBody>
                   <a:tcPr/>
@@ -8389,10 +9058,48 @@
                         <a:buNone/>
                       </a:pPr>
                       <a:r>
-                        <a:rPr lang="en-US" sz="4400" dirty="0" smtClean="0"/>
-                        <a:t>80%</a:t>
+                        <a:rPr lang="en-US" sz="4400" dirty="0"/>
+                        <a:t>91%</a:t>
                       </a:r>
-                      <a:endParaRPr lang="en-US" sz="4400" dirty="0"/>
+                    </a:p>
+                  </a:txBody>
+                  <a:tcPr/>
+                </a:tc>
+                <a:extLst>
+                  <a:ext uri="{0D108BD9-81ED-4DB2-BD59-A6C34878D82A}">
+                    <a16:rowId xmlns:a16="http://schemas.microsoft.com/office/drawing/2014/main" val="395293944"/>
+                  </a:ext>
+                </a:extLst>
+              </a:tr>
+              <a:tr h="1795477">
+                <a:tc>
+                  <a:txBody>
+                    <a:bodyPr/>
+                    <a:lstStyle/>
+                    <a:p>
+                      <a:pPr marL="0" indent="0" algn="ctr">
+                        <a:buFont typeface="+mj-lt"/>
+                        <a:buNone/>
+                      </a:pPr>
+                      <a:r>
+                        <a:rPr lang="en-US" sz="4400" dirty="0"/>
+                        <a:t>Mean average precision</a:t>
+                      </a:r>
+                      <a:br>
+                        <a:rPr lang="en-US" sz="4400" dirty="0"/>
+                      </a:br>
+                      <a:r>
+                        <a:rPr lang="en-US" sz="4400" dirty="0"/>
+                        <a:t>(</a:t>
+                      </a:r>
+                      <a:r>
+                        <a:rPr lang="en-US" sz="4400" dirty="0" err="1"/>
+                        <a:t>mAP</a:t>
+                      </a:r>
+                      <a:r>
+                        <a:rPr lang="en-US" sz="4400" dirty="0"/>
+                        <a:t> .95)</a:t>
+                      </a:r>
                     </a:p>
                   </a:txBody>
                   <a:tcPr/>
@@ -8410,10 +9117,9 @@
                         <a:buNone/>
                       </a:pPr>
                       <a:r>
-                        <a:rPr lang="en-US" sz="4400" dirty="0" smtClean="0"/>
-                        <a:t>88%</a:t>
+                        <a:rPr lang="en-US" sz="4400" dirty="0"/>
+                        <a:t>48%</a:t>
                       </a:r>
-                      <a:endParaRPr lang="en-US" sz="4400" dirty="0"/>
                     </a:p>
                   </a:txBody>
                   <a:tcPr/>
@@ -8431,10 +9137,9 @@
                         <a:buNone/>
                       </a:pPr>
                       <a:r>
-                        <a:rPr lang="en-US" sz="4400" dirty="0" smtClean="0"/>
-                        <a:t>85%</a:t>
+                        <a:rPr lang="en-US" sz="4400" dirty="0"/>
+                        <a:t>51%</a:t>
                       </a:r>
-                      <a:endParaRPr lang="en-US" sz="4400" dirty="0"/>
                     </a:p>
                   </a:txBody>
                   <a:tcPr/>
@@ -8452,17 +9157,36 @@
                         <a:buNone/>
                       </a:pPr>
                       <a:r>
-                        <a:rPr lang="en-US" sz="4400" dirty="0" smtClean="0"/>
-                        <a:t>91%</a:t>
+                        <a:rPr lang="en-US" sz="4400" dirty="0"/>
+                        <a:t>54%</a:t>
                       </a:r>
-                      <a:endParaRPr lang="en-US" sz="4400" dirty="0"/>
+                    </a:p>
+                  </a:txBody>
+                  <a:tcPr/>
+                </a:tc>
+                <a:tc>
+                  <a:txBody>
+                    <a:bodyPr/>
+                    <a:lstStyle/>
+                    <a:p>
+                      <a:pPr marL="0" indent="0" algn="ctr">
+                        <a:lnSpc>
+                          <a:spcPct val="150000"/>
+                        </a:lnSpc>
+                        <a:buFont typeface="+mj-lt"/>
+                        <a:buNone/>
+                      </a:pPr>
+                      <a:r>
+                        <a:rPr lang="en-US" sz="4400" dirty="0"/>
+                        <a:t>61%</a:t>
+                      </a:r>
                     </a:p>
                   </a:txBody>
                   <a:tcPr/>
                 </a:tc>
                 <a:extLst>
                   <a:ext uri="{0D108BD9-81ED-4DB2-BD59-A6C34878D82A}">
-                    <a16:rowId xmlns:a16="http://schemas.microsoft.com/office/drawing/2014/main" val="395293944"/>
+                    <a16:rowId xmlns:a16="http://schemas.microsoft.com/office/drawing/2014/main" val="4212997149"/>
                   </a:ext>
                 </a:extLst>
               </a:tr>
@@ -8480,13 +9204,6 @@
   <p:clrMapOvr>
     <a:masterClrMapping/>
   </p:clrMapOvr>
-  <p:timing>
-    <p:tnLst>
-      <p:par>
-        <p:cTn id="1" dur="indefinite" restart="never" nodeType="tmRoot"/>
-      </p:par>
-    </p:tnLst>
-  </p:timing>
 </p:sld>
 </file>
 

</xml_diff>